<commit_message>
Update a few presentations
</commit_message>
<xml_diff>
--- a/presentations/ParallelMODFLOW.pptx
+++ b/presentations/ParallelMODFLOW.pptx
@@ -199,7 +199,7 @@
           <a:p>
             <a:fld id="{7AFDEBC5-B985-4DBD-971A-DE566E1C50A2}" type="datetimeFigureOut">
               <a:rPr lang="nl-NL" smtClean="0"/>
-              <a:t>12-07-2023</a:t>
+              <a:t>13-07-2023</a:t>
             </a:fld>
             <a:endParaRPr lang="nl-NL"/>
           </a:p>
@@ -698,7 +698,7 @@
           <a:p>
             <a:fld id="{2BE7F1A7-46C0-614C-8973-2677197B1A3C}" type="datetimeFigureOut">
               <a:rPr lang="en-US" smtClean="0"/>
-              <a:t>7/12/23</a:t>
+              <a:t>7/13/23</a:t>
             </a:fld>
             <a:endParaRPr lang="en-US"/>
           </a:p>
@@ -896,7 +896,7 @@
           <a:p>
             <a:fld id="{2BE7F1A7-46C0-614C-8973-2677197B1A3C}" type="datetimeFigureOut">
               <a:rPr lang="en-US" smtClean="0"/>
-              <a:t>7/12/23</a:t>
+              <a:t>7/13/23</a:t>
             </a:fld>
             <a:endParaRPr lang="en-US"/>
           </a:p>
@@ -1104,7 +1104,7 @@
           <a:p>
             <a:fld id="{2BE7F1A7-46C0-614C-8973-2677197B1A3C}" type="datetimeFigureOut">
               <a:rPr lang="en-US" smtClean="0"/>
-              <a:t>7/12/23</a:t>
+              <a:t>7/13/23</a:t>
             </a:fld>
             <a:endParaRPr lang="en-US"/>
           </a:p>
@@ -1302,7 +1302,7 @@
           <a:p>
             <a:fld id="{2BE7F1A7-46C0-614C-8973-2677197B1A3C}" type="datetimeFigureOut">
               <a:rPr lang="en-US" smtClean="0"/>
-              <a:t>7/12/23</a:t>
+              <a:t>7/13/23</a:t>
             </a:fld>
             <a:endParaRPr lang="en-US"/>
           </a:p>
@@ -1577,7 +1577,7 @@
           <a:p>
             <a:fld id="{2BE7F1A7-46C0-614C-8973-2677197B1A3C}" type="datetimeFigureOut">
               <a:rPr lang="en-US" smtClean="0"/>
-              <a:t>7/12/23</a:t>
+              <a:t>7/13/23</a:t>
             </a:fld>
             <a:endParaRPr lang="en-US"/>
           </a:p>
@@ -1842,7 +1842,7 @@
           <a:p>
             <a:fld id="{2BE7F1A7-46C0-614C-8973-2677197B1A3C}" type="datetimeFigureOut">
               <a:rPr lang="en-US" smtClean="0"/>
-              <a:t>7/12/23</a:t>
+              <a:t>7/13/23</a:t>
             </a:fld>
             <a:endParaRPr lang="en-US"/>
           </a:p>
@@ -2254,7 +2254,7 @@
           <a:p>
             <a:fld id="{2BE7F1A7-46C0-614C-8973-2677197B1A3C}" type="datetimeFigureOut">
               <a:rPr lang="en-US" smtClean="0"/>
-              <a:t>7/12/23</a:t>
+              <a:t>7/13/23</a:t>
             </a:fld>
             <a:endParaRPr lang="en-US"/>
           </a:p>
@@ -2395,7 +2395,7 @@
           <a:p>
             <a:fld id="{2BE7F1A7-46C0-614C-8973-2677197B1A3C}" type="datetimeFigureOut">
               <a:rPr lang="en-US" smtClean="0"/>
-              <a:t>7/12/23</a:t>
+              <a:t>7/13/23</a:t>
             </a:fld>
             <a:endParaRPr lang="en-US"/>
           </a:p>
@@ -2508,7 +2508,7 @@
           <a:p>
             <a:fld id="{2BE7F1A7-46C0-614C-8973-2677197B1A3C}" type="datetimeFigureOut">
               <a:rPr lang="en-US" smtClean="0"/>
-              <a:t>7/12/23</a:t>
+              <a:t>7/13/23</a:t>
             </a:fld>
             <a:endParaRPr lang="en-US"/>
           </a:p>
@@ -2819,7 +2819,7 @@
           <a:p>
             <a:fld id="{2BE7F1A7-46C0-614C-8973-2677197B1A3C}" type="datetimeFigureOut">
               <a:rPr lang="en-US" smtClean="0"/>
-              <a:t>7/12/23</a:t>
+              <a:t>7/13/23</a:t>
             </a:fld>
             <a:endParaRPr lang="en-US"/>
           </a:p>
@@ -3107,7 +3107,7 @@
           <a:p>
             <a:fld id="{2BE7F1A7-46C0-614C-8973-2677197B1A3C}" type="datetimeFigureOut">
               <a:rPr lang="en-US" smtClean="0"/>
-              <a:t>7/12/23</a:t>
+              <a:t>7/13/23</a:t>
             </a:fld>
             <a:endParaRPr lang="en-US"/>
           </a:p>
@@ -3348,7 +3348,7 @@
           <a:p>
             <a:fld id="{2BE7F1A7-46C0-614C-8973-2677197B1A3C}" type="datetimeFigureOut">
               <a:rPr lang="en-US" smtClean="0"/>
-              <a:t>7/12/23</a:t>
+              <a:t>7/13/23</a:t>
             </a:fld>
             <a:endParaRPr lang="en-US"/>
           </a:p>
@@ -4543,7 +4543,7 @@
           <a:noFill/>
           <a:extLst>
             <a:ext uri="{909E8E84-426E-40dd-AFC4-6F175D3DCCD1}">
-              <a14:hiddenFill xmlns="" xmlns:a14="http://schemas.microsoft.com/office/drawing/2010/main">
+              <a14:hiddenFill xmlns:a14="http://schemas.microsoft.com/office/drawing/2010/main" xmlns="">
                 <a:solidFill>
                   <a:srgbClr val="FFFFFF"/>
                 </a:solidFill>
@@ -5048,23 +5048,7 @@
                 <a:latin typeface="Courier New" panose="02070309020205020404" pitchFamily="49" charset="0"/>
                 <a:cs typeface="Courier New" panose="02070309020205020404" pitchFamily="49" charset="0"/>
               </a:rPr>
-              <a:t>–reservation=</a:t>
-            </a:r>
-            <a:r>
-              <a:rPr lang="en-US" sz="2000" b="0" i="0" dirty="0" err="1">
-                <a:effectLst/>
-                <a:latin typeface="Courier New" panose="02070309020205020404" pitchFamily="49" charset="0"/>
-                <a:cs typeface="Courier New" panose="02070309020205020404" pitchFamily="49" charset="0"/>
-              </a:rPr>
-              <a:t>modflow</a:t>
-            </a:r>
-            <a:r>
-              <a:rPr lang="en-US" sz="2000" b="0" i="0" dirty="0">
-                <a:effectLst/>
-                <a:latin typeface="Courier New" panose="02070309020205020404" pitchFamily="49" charset="0"/>
-                <a:cs typeface="Courier New" panose="02070309020205020404" pitchFamily="49" charset="0"/>
-              </a:rPr>
-              <a:t> --</a:t>
+              <a:t>--</a:t>
             </a:r>
             <a:r>
               <a:rPr lang="en-US" sz="2000" b="0" i="0" dirty="0" err="1">
@@ -5877,37 +5861,45 @@
                 <a:latin typeface="Courier New" panose="02070309020205020404" pitchFamily="49" charset="0"/>
                 <a:cs typeface="Courier New" panose="02070309020205020404" pitchFamily="49" charset="0"/>
               </a:rPr>
-              <a:t> --account=</a:t>
-            </a:r>
-            <a:r>
-              <a:rPr lang="en-US" sz="6400" b="0" i="0">
-                <a:effectLst/>
-                <a:latin typeface="Courier New" panose="02070309020205020404" pitchFamily="49" charset="0"/>
-                <a:cs typeface="Courier New" panose="02070309020205020404" pitchFamily="49" charset="0"/>
-              </a:rPr>
-              <a:t>training </a:t>
+              <a:t> --account=training </a:t>
             </a:r>
             <a:br>
-              <a:rPr lang="en-US" sz="6400" b="0" i="0">
-                <a:effectLst/>
-                <a:latin typeface="Courier New" panose="02070309020205020404" pitchFamily="49" charset="0"/>
-                <a:cs typeface="Courier New" panose="02070309020205020404" pitchFamily="49" charset="0"/>
-              </a:rPr>
-            </a:br>
-            <a:r>
-              <a:rPr lang="en-US" sz="6400" b="0">
-                <a:latin typeface="Courier New" panose="02070309020205020404" pitchFamily="49" charset="0"/>
-                <a:cs typeface="Courier New" panose="02070309020205020404" pitchFamily="49" charset="0"/>
-              </a:rPr>
-              <a:t>--</a:t>
-            </a:r>
-            <a:r>
               <a:rPr lang="en-US" sz="6400" b="0" i="0" dirty="0">
                 <a:effectLst/>
                 <a:latin typeface="Courier New" panose="02070309020205020404" pitchFamily="49" charset="0"/>
                 <a:cs typeface="Courier New" panose="02070309020205020404" pitchFamily="49" charset="0"/>
               </a:rPr>
-              <a:t>reservation=mudflow </a:t>
+            </a:br>
+            <a:r>
+              <a:rPr lang="en-US" sz="6400" b="0" dirty="0">
+                <a:latin typeface="Courier New" panose="02070309020205020404" pitchFamily="49" charset="0"/>
+                <a:cs typeface="Courier New" panose="02070309020205020404" pitchFamily="49" charset="0"/>
+              </a:rPr>
+              <a:t>--</a:t>
+            </a:r>
+            <a:r>
+              <a:rPr lang="en-US" sz="6400" b="0" i="0" dirty="0">
+                <a:effectLst/>
+                <a:latin typeface="Courier New" panose="02070309020205020404" pitchFamily="49" charset="0"/>
+                <a:cs typeface="Courier New" panose="02070309020205020404" pitchFamily="49" charset="0"/>
+              </a:rPr>
+              <a:t>reservation=</a:t>
+            </a:r>
+            <a:r>
+              <a:rPr lang="en-US" sz="6400" b="0" i="0" dirty="0" err="1">
+                <a:effectLst/>
+                <a:latin typeface="Courier New" panose="02070309020205020404" pitchFamily="49" charset="0"/>
+                <a:cs typeface="Courier New" panose="02070309020205020404" pitchFamily="49" charset="0"/>
+              </a:rPr>
+              <a:t>modflow</a:t>
+            </a:r>
+            <a:r>
+              <a:rPr lang="en-US" sz="6400" b="0" i="0" dirty="0">
+                <a:effectLst/>
+                <a:latin typeface="Courier New" panose="02070309020205020404" pitchFamily="49" charset="0"/>
+                <a:cs typeface="Courier New" panose="02070309020205020404" pitchFamily="49" charset="0"/>
+              </a:rPr>
+              <a:t> </a:t>
             </a:r>
             <a:r>
               <a:rPr lang="en-US" sz="6400" b="0" i="0" dirty="0" err="1">

</xml_diff>